<commit_message>
Issue #1: Fix spelling for Ben
</commit_message>
<xml_diff>
--- a/misc/overview.pptx
+++ b/misc/overview.pptx
@@ -104,6 +104,11 @@
       </a:defRPr>
     </a:lvl9pPr>
   </p:defaultTextStyle>
+  <p:extLst>
+    <p:ext uri="{EFAFB233-063F-42B5-8137-9DF3F51BA10A}">
+      <p15:sldGuideLst xmlns:p15="http://schemas.microsoft.com/office/powerpoint/2012/main"/>
+    </p:ext>
+  </p:extLst>
 </p:presentation>
 </file>
 
@@ -238,7 +243,7 @@
           <a:p>
             <a:fld id="{DDDBF486-87FE-4D3C-BEED-0F4FF1B2EFB3}" type="datetimeFigureOut">
               <a:rPr lang="en-GB" smtClean="0"/>
-              <a:t>19/04/2017</a:t>
+              <a:t>24/11/2017</a:t>
             </a:fld>
             <a:endParaRPr lang="en-GB"/>
           </a:p>
@@ -408,7 +413,7 @@
           <a:p>
             <a:fld id="{DDDBF486-87FE-4D3C-BEED-0F4FF1B2EFB3}" type="datetimeFigureOut">
               <a:rPr lang="en-GB" smtClean="0"/>
-              <a:t>19/04/2017</a:t>
+              <a:t>24/11/2017</a:t>
             </a:fld>
             <a:endParaRPr lang="en-GB"/>
           </a:p>
@@ -588,7 +593,7 @@
           <a:p>
             <a:fld id="{DDDBF486-87FE-4D3C-BEED-0F4FF1B2EFB3}" type="datetimeFigureOut">
               <a:rPr lang="en-GB" smtClean="0"/>
-              <a:t>19/04/2017</a:t>
+              <a:t>24/11/2017</a:t>
             </a:fld>
             <a:endParaRPr lang="en-GB"/>
           </a:p>
@@ -758,7 +763,7 @@
           <a:p>
             <a:fld id="{DDDBF486-87FE-4D3C-BEED-0F4FF1B2EFB3}" type="datetimeFigureOut">
               <a:rPr lang="en-GB" smtClean="0"/>
-              <a:t>19/04/2017</a:t>
+              <a:t>24/11/2017</a:t>
             </a:fld>
             <a:endParaRPr lang="en-GB"/>
           </a:p>
@@ -1004,7 +1009,7 @@
           <a:p>
             <a:fld id="{DDDBF486-87FE-4D3C-BEED-0F4FF1B2EFB3}" type="datetimeFigureOut">
               <a:rPr lang="en-GB" smtClean="0"/>
-              <a:t>19/04/2017</a:t>
+              <a:t>24/11/2017</a:t>
             </a:fld>
             <a:endParaRPr lang="en-GB"/>
           </a:p>
@@ -1236,7 +1241,7 @@
           <a:p>
             <a:fld id="{DDDBF486-87FE-4D3C-BEED-0F4FF1B2EFB3}" type="datetimeFigureOut">
               <a:rPr lang="en-GB" smtClean="0"/>
-              <a:t>19/04/2017</a:t>
+              <a:t>24/11/2017</a:t>
             </a:fld>
             <a:endParaRPr lang="en-GB"/>
           </a:p>
@@ -1603,7 +1608,7 @@
           <a:p>
             <a:fld id="{DDDBF486-87FE-4D3C-BEED-0F4FF1B2EFB3}" type="datetimeFigureOut">
               <a:rPr lang="en-GB" smtClean="0"/>
-              <a:t>19/04/2017</a:t>
+              <a:t>24/11/2017</a:t>
             </a:fld>
             <a:endParaRPr lang="en-GB"/>
           </a:p>
@@ -1721,7 +1726,7 @@
           <a:p>
             <a:fld id="{DDDBF486-87FE-4D3C-BEED-0F4FF1B2EFB3}" type="datetimeFigureOut">
               <a:rPr lang="en-GB" smtClean="0"/>
-              <a:t>19/04/2017</a:t>
+              <a:t>24/11/2017</a:t>
             </a:fld>
             <a:endParaRPr lang="en-GB"/>
           </a:p>
@@ -1816,7 +1821,7 @@
           <a:p>
             <a:fld id="{DDDBF486-87FE-4D3C-BEED-0F4FF1B2EFB3}" type="datetimeFigureOut">
               <a:rPr lang="en-GB" smtClean="0"/>
-              <a:t>19/04/2017</a:t>
+              <a:t>24/11/2017</a:t>
             </a:fld>
             <a:endParaRPr lang="en-GB"/>
           </a:p>
@@ -2093,7 +2098,7 @@
           <a:p>
             <a:fld id="{DDDBF486-87FE-4D3C-BEED-0F4FF1B2EFB3}" type="datetimeFigureOut">
               <a:rPr lang="en-GB" smtClean="0"/>
-              <a:t>19/04/2017</a:t>
+              <a:t>24/11/2017</a:t>
             </a:fld>
             <a:endParaRPr lang="en-GB"/>
           </a:p>
@@ -2346,7 +2351,7 @@
           <a:p>
             <a:fld id="{DDDBF486-87FE-4D3C-BEED-0F4FF1B2EFB3}" type="datetimeFigureOut">
               <a:rPr lang="en-GB" smtClean="0"/>
-              <a:t>19/04/2017</a:t>
+              <a:t>24/11/2017</a:t>
             </a:fld>
             <a:endParaRPr lang="en-GB"/>
           </a:p>
@@ -2559,7 +2564,7 @@
           <a:p>
             <a:fld id="{DDDBF486-87FE-4D3C-BEED-0F4FF1B2EFB3}" type="datetimeFigureOut">
               <a:rPr lang="en-GB" smtClean="0"/>
-              <a:t>19/04/2017</a:t>
+              <a:t>24/11/2017</a:t>
             </a:fld>
             <a:endParaRPr lang="en-GB"/>
           </a:p>
@@ -3050,15 +3055,19 @@
           <a:p>
             <a:r>
               <a:rPr lang="en-GB" sz="1400" dirty="0" smtClean="0"/>
-              <a:t>Three viewing windows show Axial, Coronal and </a:t>
-            </a:r>
-            <a:r>
-              <a:rPr lang="en-GB" sz="1400" dirty="0" err="1" smtClean="0"/>
-              <a:t>Saggital</a:t>
+              <a:t>Three viewing windows show Axial, Coronal </a:t>
+            </a:r>
+            <a:r>
+              <a:rPr lang="en-GB" sz="1400" smtClean="0"/>
+              <a:t>and </a:t>
+            </a:r>
+            <a:r>
+              <a:rPr lang="en-GB" sz="1400" smtClean="0"/>
+              <a:t>Sagittal </a:t>
             </a:r>
             <a:r>
               <a:rPr lang="en-GB" sz="1400" dirty="0" smtClean="0"/>
-              <a:t> slices. Left click to focus a point, drag to move the image. Right click and drag to zoom. Mouse wheel to move through the slices. Double click to maximise/restore the current view.</a:t>
+              <a:t>slices. Left click to focus a point, drag to move the image. Right click and drag to zoom. Mouse wheel to move through the slices. Double click to maximise/restore the current view.</a:t>
             </a:r>
           </a:p>
         </p:txBody>

</xml_diff>